<commit_message>
New slides, minor modifications to scripts
</commit_message>
<xml_diff>
--- a/deep-learning-in-practice-with-pytorch/4-recurrent-neural-networks.pptx
+++ b/deep-learning-in-practice-with-pytorch/4-recurrent-neural-networks.pptx
@@ -222,7 +222,7 @@
           <a:p>
             <a:fld id="{9E17B43C-29D6-4652-97CC-8D4004F0763A}" type="datetimeFigureOut">
               <a:rPr lang="en-US" smtClean="0"/>
-              <a:t>4/9/2024</a:t>
+              <a:t>4/10/2024</a:t>
             </a:fld>
             <a:endParaRPr lang="en-US"/>
           </a:p>
@@ -4053,6 +4053,9 @@
             <a:prstGeom prst="rect">
               <a:avLst/>
             </a:prstGeom>
+            <a:solidFill>
+              <a:srgbClr val="F7C8F8"/>
+            </a:solidFill>
           </p:spPr>
           <p:style>
             <a:lnRef idx="2">
@@ -4074,10 +4077,9 @@
             <a:p>
               <a:pPr algn="ctr"/>
               <a:r>
-                <a:rPr lang="en-US" sz="2800"/>
+                <a:rPr lang="en-US" sz="2800" dirty="0"/>
                 <a:t>0.0</a:t>
               </a:r>
-              <a:endParaRPr lang="en-US" sz="2800" dirty="0"/>
             </a:p>
           </p:txBody>
         </p:sp>
@@ -6196,6 +6198,9 @@
             <a:prstGeom prst="rect">
               <a:avLst/>
             </a:prstGeom>
+            <a:solidFill>
+              <a:srgbClr val="F7C8F8"/>
+            </a:solidFill>
           </p:spPr>
           <p:style>
             <a:lnRef idx="2">
@@ -27786,6 +27791,9 @@
           <a:prstGeom prst="rect">
             <a:avLst/>
           </a:prstGeom>
+          <a:solidFill>
+            <a:srgbClr val="F7C8F8"/>
+          </a:solidFill>
         </p:spPr>
         <p:style>
           <a:lnRef idx="2">
@@ -30499,6 +30507,9 @@
           <a:prstGeom prst="rect">
             <a:avLst/>
           </a:prstGeom>
+          <a:solidFill>
+            <a:srgbClr val="F7C8F8"/>
+          </a:solidFill>
         </p:spPr>
         <p:style>
           <a:lnRef idx="2">
@@ -39230,6 +39241,9 @@
             <a:prstGeom prst="rect">
               <a:avLst/>
             </a:prstGeom>
+            <a:solidFill>
+              <a:srgbClr val="F7C8F8"/>
+            </a:solidFill>
           </p:spPr>
           <p:style>
             <a:lnRef idx="2">

</xml_diff>